<commit_message>
V 0.8 - Full API
</commit_message>
<xml_diff>
--- a/WEBproject.pptx
+++ b/WEBproject.pptx
@@ -109,6 +109,11 @@
       </a:defRPr>
     </a:lvl9pPr>
   </p:defaultTextStyle>
+  <p:extLst>
+    <p:ext uri="{EFAFB233-063F-42B5-8137-9DF3F51BA10A}">
+      <p15:sldGuideLst xmlns:p15="http://schemas.microsoft.com/office/powerpoint/2012/main"/>
+    </p:ext>
+  </p:extLst>
 </p:presentation>
 </file>
 
@@ -263,7 +268,7 @@
           <a:p>
             <a:fld id="{4CDE23C7-78A4-413A-A84B-93D4CC0A9EB1}" type="datetimeFigureOut">
               <a:rPr lang="en-US" smtClean="0"/>
-              <a:t>5/4/2025</a:t>
+              <a:t>5/8/2025</a:t>
             </a:fld>
             <a:endParaRPr lang="en-US"/>
           </a:p>
@@ -466,7 +471,7 @@
           <a:p>
             <a:fld id="{4CDE23C7-78A4-413A-A84B-93D4CC0A9EB1}" type="datetimeFigureOut">
               <a:rPr lang="en-US" smtClean="0"/>
-              <a:t>5/4/2025</a:t>
+              <a:t>5/8/2025</a:t>
             </a:fld>
             <a:endParaRPr lang="en-US"/>
           </a:p>
@@ -674,7 +679,7 @@
           <a:p>
             <a:fld id="{4CDE23C7-78A4-413A-A84B-93D4CC0A9EB1}" type="datetimeFigureOut">
               <a:rPr lang="en-US" smtClean="0"/>
-              <a:t>5/4/2025</a:t>
+              <a:t>5/8/2025</a:t>
             </a:fld>
             <a:endParaRPr lang="en-US"/>
           </a:p>
@@ -872,7 +877,7 @@
           <a:p>
             <a:fld id="{4CDE23C7-78A4-413A-A84B-93D4CC0A9EB1}" type="datetimeFigureOut">
               <a:rPr lang="en-US" smtClean="0"/>
-              <a:t>5/4/2025</a:t>
+              <a:t>5/8/2025</a:t>
             </a:fld>
             <a:endParaRPr lang="en-US"/>
           </a:p>
@@ -1149,7 +1154,7 @@
           <a:p>
             <a:fld id="{4CDE23C7-78A4-413A-A84B-93D4CC0A9EB1}" type="datetimeFigureOut">
               <a:rPr lang="en-US" smtClean="0"/>
-              <a:t>5/4/2025</a:t>
+              <a:t>5/8/2025</a:t>
             </a:fld>
             <a:endParaRPr lang="en-US"/>
           </a:p>
@@ -1414,7 +1419,7 @@
           <a:p>
             <a:fld id="{4CDE23C7-78A4-413A-A84B-93D4CC0A9EB1}" type="datetimeFigureOut">
               <a:rPr lang="en-US" smtClean="0"/>
-              <a:t>5/4/2025</a:t>
+              <a:t>5/8/2025</a:t>
             </a:fld>
             <a:endParaRPr lang="en-US"/>
           </a:p>
@@ -1830,7 +1835,7 @@
           <a:p>
             <a:fld id="{4CDE23C7-78A4-413A-A84B-93D4CC0A9EB1}" type="datetimeFigureOut">
               <a:rPr lang="en-US" smtClean="0"/>
-              <a:t>5/4/2025</a:t>
+              <a:t>5/8/2025</a:t>
             </a:fld>
             <a:endParaRPr lang="en-US"/>
           </a:p>
@@ -1971,7 +1976,7 @@
           <a:p>
             <a:fld id="{4CDE23C7-78A4-413A-A84B-93D4CC0A9EB1}" type="datetimeFigureOut">
               <a:rPr lang="en-US" smtClean="0"/>
-              <a:t>5/4/2025</a:t>
+              <a:t>5/8/2025</a:t>
             </a:fld>
             <a:endParaRPr lang="en-US"/>
           </a:p>
@@ -2084,7 +2089,7 @@
           <a:p>
             <a:fld id="{4CDE23C7-78A4-413A-A84B-93D4CC0A9EB1}" type="datetimeFigureOut">
               <a:rPr lang="en-US" smtClean="0"/>
-              <a:t>5/4/2025</a:t>
+              <a:t>5/8/2025</a:t>
             </a:fld>
             <a:endParaRPr lang="en-US"/>
           </a:p>
@@ -2395,7 +2400,7 @@
           <a:p>
             <a:fld id="{4CDE23C7-78A4-413A-A84B-93D4CC0A9EB1}" type="datetimeFigureOut">
               <a:rPr lang="en-US" smtClean="0"/>
-              <a:t>5/4/2025</a:t>
+              <a:t>5/8/2025</a:t>
             </a:fld>
             <a:endParaRPr lang="en-US"/>
           </a:p>
@@ -2683,7 +2688,7 @@
           <a:p>
             <a:fld id="{4CDE23C7-78A4-413A-A84B-93D4CC0A9EB1}" type="datetimeFigureOut">
               <a:rPr lang="en-US" smtClean="0"/>
-              <a:t>5/4/2025</a:t>
+              <a:t>5/8/2025</a:t>
             </a:fld>
             <a:endParaRPr lang="en-US"/>
           </a:p>
@@ -2923,7 +2928,7 @@
             <a:fld id="{4CDE23C7-78A4-413A-A84B-93D4CC0A9EB1}" type="datetimeFigureOut">
               <a:rPr lang="en-US" smtClean="0"/>
               <a:pPr/>
-              <a:t>5/4/2025</a:t>
+              <a:t>5/8/2025</a:t>
             </a:fld>
             <a:endParaRPr lang="en-US" dirty="0"/>
           </a:p>
@@ -4090,6 +4095,42 @@
           </a:p>
         </p:txBody>
       </p:sp>
+      <p:pic>
+        <p:nvPicPr>
+          <p:cNvPr id="5" name="Рисунок 4" descr="Изображение выглядит как текст, снимок экрана, Шрифт, дизайн&#10;&#10;Контент, сгенерированный ИИ, может содержать ошибки.">
+            <a:extLst>
+              <a:ext uri="{FF2B5EF4-FFF2-40B4-BE49-F238E27FC236}">
+                <a16:creationId xmlns:a16="http://schemas.microsoft.com/office/drawing/2014/main" id="{04F6EA02-B4A6-D988-1BF0-CFA4C30C25A4}"/>
+              </a:ext>
+            </a:extLst>
+          </p:cNvPr>
+          <p:cNvPicPr>
+            <a:picLocks noChangeAspect="1"/>
+          </p:cNvPicPr>
+          <p:nvPr/>
+        </p:nvPicPr>
+        <p:blipFill>
+          <a:blip r:embed="rId2">
+            <a:extLst>
+              <a:ext uri="{28A0092B-C50C-407E-A947-70E740481C1C}">
+                <a14:useLocalDpi xmlns:a14="http://schemas.microsoft.com/office/drawing/2010/main" val="0"/>
+              </a:ext>
+            </a:extLst>
+          </a:blip>
+          <a:stretch>
+            <a:fillRect/>
+          </a:stretch>
+        </p:blipFill>
+        <p:spPr>
+          <a:xfrm>
+            <a:off x="6622596" y="1489900"/>
+            <a:ext cx="3809028" cy="4483916"/>
+          </a:xfrm>
+          <a:prstGeom prst="rect">
+            <a:avLst/>
+          </a:prstGeom>
+        </p:spPr>
+      </p:pic>
     </p:spTree>
     <p:extLst>
       <p:ext uri="{BB962C8B-B14F-4D97-AF65-F5344CB8AC3E}">
@@ -4217,6 +4258,42 @@
           </a:p>
         </p:txBody>
       </p:sp>
+      <p:pic>
+        <p:nvPicPr>
+          <p:cNvPr id="5" name="Рисунок 4" descr="Изображение выглядит как текст, снимок экрана, логотип, Шрифт&#10;&#10;Контент, сгенерированный ИИ, может содержать ошибки.">
+            <a:extLst>
+              <a:ext uri="{FF2B5EF4-FFF2-40B4-BE49-F238E27FC236}">
+                <a16:creationId xmlns:a16="http://schemas.microsoft.com/office/drawing/2014/main" id="{6364B8C8-0B34-A5BC-83E4-EFD465C93796}"/>
+              </a:ext>
+            </a:extLst>
+          </p:cNvPr>
+          <p:cNvPicPr>
+            <a:picLocks noChangeAspect="1"/>
+          </p:cNvPicPr>
+          <p:nvPr/>
+        </p:nvPicPr>
+        <p:blipFill>
+          <a:blip r:embed="rId2">
+            <a:extLst>
+              <a:ext uri="{28A0092B-C50C-407E-A947-70E740481C1C}">
+                <a14:useLocalDpi xmlns:a14="http://schemas.microsoft.com/office/drawing/2010/main" val="0"/>
+              </a:ext>
+            </a:extLst>
+          </a:blip>
+          <a:stretch>
+            <a:fillRect/>
+          </a:stretch>
+        </p:blipFill>
+        <p:spPr>
+          <a:xfrm>
+            <a:off x="3260521" y="3520921"/>
+            <a:ext cx="5670958" cy="2789548"/>
+          </a:xfrm>
+          <a:prstGeom prst="rect">
+            <a:avLst/>
+          </a:prstGeom>
+        </p:spPr>
+      </p:pic>
     </p:spTree>
     <p:extLst>
       <p:ext uri="{BB962C8B-B14F-4D97-AF65-F5344CB8AC3E}">
@@ -4336,21 +4413,7 @@
                 <a:latin typeface="Times New Roman" panose="02020603050405020304" pitchFamily="18" charset="0"/>
                 <a:cs typeface="Times New Roman" panose="02020603050405020304" pitchFamily="18" charset="0"/>
               </a:rPr>
-              <a:t>Flask-RESTful (API), </a:t>
-            </a:r>
-            <a:r>
-              <a:rPr lang="en-US" dirty="0" err="1">
-                <a:latin typeface="Times New Roman" panose="02020603050405020304" pitchFamily="18" charset="0"/>
-                <a:cs typeface="Times New Roman" panose="02020603050405020304" pitchFamily="18" charset="0"/>
-              </a:rPr>
-              <a:t>SQLAlchemy</a:t>
-            </a:r>
-            <a:r>
-              <a:rPr lang="en-US" dirty="0">
-                <a:latin typeface="Times New Roman" panose="02020603050405020304" pitchFamily="18" charset="0"/>
-                <a:cs typeface="Times New Roman" panose="02020603050405020304" pitchFamily="18" charset="0"/>
-              </a:rPr>
-              <a:t> (</a:t>
+              <a:t>Flask-RESTful (API), SQLite (</a:t>
             </a:r>
             <a:r>
               <a:rPr lang="ru-RU" dirty="0">
@@ -4567,7 +4630,7 @@
                 <a:latin typeface="Times New Roman" panose="02020603050405020304" pitchFamily="18" charset="0"/>
                 <a:cs typeface="Times New Roman" panose="02020603050405020304" pitchFamily="18" charset="0"/>
               </a:rPr>
-              <a:t>Расширение базы упражнений (фото и видео примеры, описание техники)</a:t>
+              <a:t>Расширение базы упражнений (фото и видео примеры)</a:t>
             </a:r>
           </a:p>
         </p:txBody>

</xml_diff>

<commit_message>
V 1.1 - Full Release
</commit_message>
<xml_diff>
--- a/WEBproject.pptx
+++ b/WEBproject.pptx
@@ -268,7 +268,7 @@
           <a:p>
             <a:fld id="{4CDE23C7-78A4-413A-A84B-93D4CC0A9EB1}" type="datetimeFigureOut">
               <a:rPr lang="en-US" smtClean="0"/>
-              <a:t>5/8/2025</a:t>
+              <a:t>5/12/2025</a:t>
             </a:fld>
             <a:endParaRPr lang="en-US"/>
           </a:p>
@@ -471,7 +471,7 @@
           <a:p>
             <a:fld id="{4CDE23C7-78A4-413A-A84B-93D4CC0A9EB1}" type="datetimeFigureOut">
               <a:rPr lang="en-US" smtClean="0"/>
-              <a:t>5/8/2025</a:t>
+              <a:t>5/12/2025</a:t>
             </a:fld>
             <a:endParaRPr lang="en-US"/>
           </a:p>
@@ -679,7 +679,7 @@
           <a:p>
             <a:fld id="{4CDE23C7-78A4-413A-A84B-93D4CC0A9EB1}" type="datetimeFigureOut">
               <a:rPr lang="en-US" smtClean="0"/>
-              <a:t>5/8/2025</a:t>
+              <a:t>5/12/2025</a:t>
             </a:fld>
             <a:endParaRPr lang="en-US"/>
           </a:p>
@@ -877,7 +877,7 @@
           <a:p>
             <a:fld id="{4CDE23C7-78A4-413A-A84B-93D4CC0A9EB1}" type="datetimeFigureOut">
               <a:rPr lang="en-US" smtClean="0"/>
-              <a:t>5/8/2025</a:t>
+              <a:t>5/12/2025</a:t>
             </a:fld>
             <a:endParaRPr lang="en-US"/>
           </a:p>
@@ -1154,7 +1154,7 @@
           <a:p>
             <a:fld id="{4CDE23C7-78A4-413A-A84B-93D4CC0A9EB1}" type="datetimeFigureOut">
               <a:rPr lang="en-US" smtClean="0"/>
-              <a:t>5/8/2025</a:t>
+              <a:t>5/12/2025</a:t>
             </a:fld>
             <a:endParaRPr lang="en-US"/>
           </a:p>
@@ -1419,7 +1419,7 @@
           <a:p>
             <a:fld id="{4CDE23C7-78A4-413A-A84B-93D4CC0A9EB1}" type="datetimeFigureOut">
               <a:rPr lang="en-US" smtClean="0"/>
-              <a:t>5/8/2025</a:t>
+              <a:t>5/12/2025</a:t>
             </a:fld>
             <a:endParaRPr lang="en-US"/>
           </a:p>
@@ -1835,7 +1835,7 @@
           <a:p>
             <a:fld id="{4CDE23C7-78A4-413A-A84B-93D4CC0A9EB1}" type="datetimeFigureOut">
               <a:rPr lang="en-US" smtClean="0"/>
-              <a:t>5/8/2025</a:t>
+              <a:t>5/12/2025</a:t>
             </a:fld>
             <a:endParaRPr lang="en-US"/>
           </a:p>
@@ -1976,7 +1976,7 @@
           <a:p>
             <a:fld id="{4CDE23C7-78A4-413A-A84B-93D4CC0A9EB1}" type="datetimeFigureOut">
               <a:rPr lang="en-US" smtClean="0"/>
-              <a:t>5/8/2025</a:t>
+              <a:t>5/12/2025</a:t>
             </a:fld>
             <a:endParaRPr lang="en-US"/>
           </a:p>
@@ -2089,7 +2089,7 @@
           <a:p>
             <a:fld id="{4CDE23C7-78A4-413A-A84B-93D4CC0A9EB1}" type="datetimeFigureOut">
               <a:rPr lang="en-US" smtClean="0"/>
-              <a:t>5/8/2025</a:t>
+              <a:t>5/12/2025</a:t>
             </a:fld>
             <a:endParaRPr lang="en-US"/>
           </a:p>
@@ -2400,7 +2400,7 @@
           <a:p>
             <a:fld id="{4CDE23C7-78A4-413A-A84B-93D4CC0A9EB1}" type="datetimeFigureOut">
               <a:rPr lang="en-US" smtClean="0"/>
-              <a:t>5/8/2025</a:t>
+              <a:t>5/12/2025</a:t>
             </a:fld>
             <a:endParaRPr lang="en-US"/>
           </a:p>
@@ -2688,7 +2688,7 @@
           <a:p>
             <a:fld id="{4CDE23C7-78A4-413A-A84B-93D4CC0A9EB1}" type="datetimeFigureOut">
               <a:rPr lang="en-US" smtClean="0"/>
-              <a:t>5/8/2025</a:t>
+              <a:t>5/12/2025</a:t>
             </a:fld>
             <a:endParaRPr lang="en-US"/>
           </a:p>
@@ -2928,7 +2928,7 @@
             <a:fld id="{4CDE23C7-78A4-413A-A84B-93D4CC0A9EB1}" type="datetimeFigureOut">
               <a:rPr lang="en-US" smtClean="0"/>
               <a:pPr/>
-              <a:t>5/8/2025</a:t>
+              <a:t>5/12/2025</a:t>
             </a:fld>
             <a:endParaRPr lang="en-US" dirty="0"/>
           </a:p>
@@ -4123,7 +4123,7 @@
         </p:blipFill>
         <p:spPr>
           <a:xfrm>
-            <a:off x="6622596" y="1489900"/>
+            <a:off x="7161439" y="1685843"/>
             <a:ext cx="3809028" cy="4483916"/>
           </a:xfrm>
           <a:prstGeom prst="rect">
@@ -4227,7 +4227,7 @@
                 <a:latin typeface="Times New Roman" panose="02020603050405020304" pitchFamily="18" charset="0"/>
                 <a:cs typeface="Times New Roman" panose="02020603050405020304" pitchFamily="18" charset="0"/>
               </a:rPr>
-              <a:t>Возможность регистрации и авторизации пользователей</a:t>
+              <a:t>Возможность регистрации и авторизации пользователей, а также редактирования личной информации</a:t>
             </a:r>
           </a:p>
           <a:p>
@@ -4286,8 +4286,8 @@
         </p:blipFill>
         <p:spPr>
           <a:xfrm>
-            <a:off x="3260521" y="3520921"/>
-            <a:ext cx="5670958" cy="2789548"/>
+            <a:off x="3480957" y="3925886"/>
+            <a:ext cx="4781300" cy="2351925"/>
           </a:xfrm>
           <a:prstGeom prst="rect">
             <a:avLst/>
@@ -4429,17 +4429,29 @@
                 <a:latin typeface="Times New Roman" panose="02020603050405020304" pitchFamily="18" charset="0"/>
                 <a:cs typeface="Times New Roman" panose="02020603050405020304" pitchFamily="18" charset="0"/>
               </a:rPr>
-              <a:t>Frontend: HTML/CSS</a:t>
-            </a:r>
-            <a:endParaRPr lang="ru-RU" dirty="0">
-              <a:latin typeface="Times New Roman" panose="02020603050405020304" pitchFamily="18" charset="0"/>
-              <a:cs typeface="Times New Roman" panose="02020603050405020304" pitchFamily="18" charset="0"/>
-            </a:endParaRPr>
-          </a:p>
-          <a:p>
-            <a:pPr marL="0" indent="0">
-              <a:buNone/>
-            </a:pPr>
+              <a:t>Frontend:</a:t>
+            </a:r>
+            <a:r>
+              <a:rPr lang="ru-RU" dirty="0">
+                <a:latin typeface="Times New Roman" panose="02020603050405020304" pitchFamily="18" charset="0"/>
+                <a:cs typeface="Times New Roman" panose="02020603050405020304" pitchFamily="18" charset="0"/>
+              </a:rPr>
+              <a:t> </a:t>
+            </a:r>
+            <a:r>
+              <a:rPr lang="en-US">
+                <a:latin typeface="Times New Roman" panose="02020603050405020304" pitchFamily="18" charset="0"/>
+                <a:cs typeface="Times New Roman" panose="02020603050405020304" pitchFamily="18" charset="0"/>
+              </a:rPr>
+              <a:t>HTML</a:t>
+            </a:r>
+            <a:r>
+              <a:rPr lang="en-US" dirty="0">
+                <a:latin typeface="Times New Roman" panose="02020603050405020304" pitchFamily="18" charset="0"/>
+                <a:cs typeface="Times New Roman" panose="02020603050405020304" pitchFamily="18" charset="0"/>
+              </a:rPr>
+              <a:t>/CSS</a:t>
+            </a:r>
             <a:endParaRPr lang="ru-RU" dirty="0">
               <a:latin typeface="Times New Roman" panose="02020603050405020304" pitchFamily="18" charset="0"/>
               <a:cs typeface="Times New Roman" panose="02020603050405020304" pitchFamily="18" charset="0"/>
@@ -4598,6 +4610,43 @@
             <a:pPr marL="0" indent="0">
               <a:buNone/>
             </a:pPr>
+            <a:r>
+              <a:rPr lang="ru-RU" dirty="0">
+                <a:latin typeface="Times New Roman" panose="02020603050405020304" pitchFamily="18" charset="0"/>
+                <a:cs typeface="Times New Roman" panose="02020603050405020304" pitchFamily="18" charset="0"/>
+              </a:rPr>
+              <a:t>Продукт проекта доступен по </a:t>
+            </a:r>
+            <a:r>
+              <a:rPr lang="ru-RU" dirty="0" err="1">
+                <a:latin typeface="Times New Roman" panose="02020603050405020304" pitchFamily="18" charset="0"/>
+                <a:cs typeface="Times New Roman" panose="02020603050405020304" pitchFamily="18" charset="0"/>
+              </a:rPr>
+              <a:t>ссыле</a:t>
+            </a:r>
+            <a:r>
+              <a:rPr lang="ru-RU" dirty="0">
+                <a:latin typeface="Times New Roman" panose="02020603050405020304" pitchFamily="18" charset="0"/>
+                <a:cs typeface="Times New Roman" panose="02020603050405020304" pitchFamily="18" charset="0"/>
+              </a:rPr>
+              <a:t>: </a:t>
+            </a:r>
+            <a:r>
+              <a:rPr lang="en-US" b="1" dirty="0">
+                <a:latin typeface="Times New Roman" panose="02020603050405020304" pitchFamily="18" charset="0"/>
+                <a:cs typeface="Times New Roman" panose="02020603050405020304" pitchFamily="18" charset="0"/>
+              </a:rPr>
+              <a:t>https://ordinary-important-boysenberry.glitch.me/</a:t>
+            </a:r>
+            <a:endParaRPr lang="ru-RU" b="1" dirty="0">
+              <a:latin typeface="Times New Roman" panose="02020603050405020304" pitchFamily="18" charset="0"/>
+              <a:cs typeface="Times New Roman" panose="02020603050405020304" pitchFamily="18" charset="0"/>
+            </a:endParaRPr>
+          </a:p>
+          <a:p>
+            <a:pPr marL="0" indent="0">
+              <a:buNone/>
+            </a:pPr>
             <a:endParaRPr lang="ru-RU" dirty="0">
               <a:latin typeface="Times New Roman" panose="02020603050405020304" pitchFamily="18" charset="0"/>
               <a:cs typeface="Times New Roman" panose="02020603050405020304" pitchFamily="18" charset="0"/>
@@ -4621,7 +4670,7 @@
                 <a:latin typeface="Times New Roman" panose="02020603050405020304" pitchFamily="18" charset="0"/>
                 <a:cs typeface="Times New Roman" panose="02020603050405020304" pitchFamily="18" charset="0"/>
               </a:rPr>
-              <a:t>Добавление мобильного приложения</a:t>
+              <a:t>Расширение базы упражнений (фото и видео примеры)</a:t>
             </a:r>
           </a:p>
           <a:p>
@@ -4630,7 +4679,7 @@
                 <a:latin typeface="Times New Roman" panose="02020603050405020304" pitchFamily="18" charset="0"/>
                 <a:cs typeface="Times New Roman" panose="02020603050405020304" pitchFamily="18" charset="0"/>
               </a:rPr>
-              <a:t>Расширение базы упражнений (фото и видео примеры)</a:t>
+              <a:t>Возможность ручной корректировки программы тренировки</a:t>
             </a:r>
           </a:p>
         </p:txBody>

</xml_diff>